<commit_message>
finished revising week 1, with all files
</commit_message>
<xml_diff>
--- a/week_1/1.9 Variables.pptx
+++ b/week_1/1.9 Variables.pptx
@@ -194,7 +194,7 @@
           <a:p>
             <a:fld id="{E2E01966-F14F-EA45-806A-07F63E4623ED}" type="datetimeFigureOut">
               <a:rPr lang="en-US" smtClean="0"/>
-              <a:t>8/15/15</a:t>
+              <a:t>8/17/15</a:t>
             </a:fld>
             <a:endParaRPr lang="en-US"/>
           </a:p>
@@ -643,7 +643,7 @@
           <a:p>
             <a:fld id="{51DC3912-A3A9-D04D-BD3B-606E389382B7}" type="datetimeFigureOut">
               <a:rPr lang="en-US" smtClean="0"/>
-              <a:t>8/15/15</a:t>
+              <a:t>8/17/15</a:t>
             </a:fld>
             <a:endParaRPr lang="en-US"/>
           </a:p>
@@ -813,7 +813,7 @@
           <a:p>
             <a:fld id="{51DC3912-A3A9-D04D-BD3B-606E389382B7}" type="datetimeFigureOut">
               <a:rPr lang="en-US" smtClean="0"/>
-              <a:t>8/15/15</a:t>
+              <a:t>8/17/15</a:t>
             </a:fld>
             <a:endParaRPr lang="en-US"/>
           </a:p>
@@ -993,7 +993,7 @@
           <a:p>
             <a:fld id="{51DC3912-A3A9-D04D-BD3B-606E389382B7}" type="datetimeFigureOut">
               <a:rPr lang="en-US" smtClean="0"/>
-              <a:t>8/15/15</a:t>
+              <a:t>8/17/15</a:t>
             </a:fld>
             <a:endParaRPr lang="en-US"/>
           </a:p>
@@ -1163,7 +1163,7 @@
           <a:p>
             <a:fld id="{51DC3912-A3A9-D04D-BD3B-606E389382B7}" type="datetimeFigureOut">
               <a:rPr lang="en-US" smtClean="0"/>
-              <a:t>8/15/15</a:t>
+              <a:t>8/17/15</a:t>
             </a:fld>
             <a:endParaRPr lang="en-US"/>
           </a:p>
@@ -1409,7 +1409,7 @@
           <a:p>
             <a:fld id="{51DC3912-A3A9-D04D-BD3B-606E389382B7}" type="datetimeFigureOut">
               <a:rPr lang="en-US" smtClean="0"/>
-              <a:t>8/15/15</a:t>
+              <a:t>8/17/15</a:t>
             </a:fld>
             <a:endParaRPr lang="en-US"/>
           </a:p>
@@ -1697,7 +1697,7 @@
           <a:p>
             <a:fld id="{51DC3912-A3A9-D04D-BD3B-606E389382B7}" type="datetimeFigureOut">
               <a:rPr lang="en-US" smtClean="0"/>
-              <a:t>8/15/15</a:t>
+              <a:t>8/17/15</a:t>
             </a:fld>
             <a:endParaRPr lang="en-US"/>
           </a:p>
@@ -2119,7 +2119,7 @@
           <a:p>
             <a:fld id="{51DC3912-A3A9-D04D-BD3B-606E389382B7}" type="datetimeFigureOut">
               <a:rPr lang="en-US" smtClean="0"/>
-              <a:t>8/15/15</a:t>
+              <a:t>8/17/15</a:t>
             </a:fld>
             <a:endParaRPr lang="en-US"/>
           </a:p>
@@ -2237,7 +2237,7 @@
           <a:p>
             <a:fld id="{51DC3912-A3A9-D04D-BD3B-606E389382B7}" type="datetimeFigureOut">
               <a:rPr lang="en-US" smtClean="0"/>
-              <a:t>8/15/15</a:t>
+              <a:t>8/17/15</a:t>
             </a:fld>
             <a:endParaRPr lang="en-US"/>
           </a:p>
@@ -2332,7 +2332,7 @@
           <a:p>
             <a:fld id="{51DC3912-A3A9-D04D-BD3B-606E389382B7}" type="datetimeFigureOut">
               <a:rPr lang="en-US" smtClean="0"/>
-              <a:t>8/15/15</a:t>
+              <a:t>8/17/15</a:t>
             </a:fld>
             <a:endParaRPr lang="en-US"/>
           </a:p>
@@ -2609,7 +2609,7 @@
           <a:p>
             <a:fld id="{51DC3912-A3A9-D04D-BD3B-606E389382B7}" type="datetimeFigureOut">
               <a:rPr lang="en-US" smtClean="0"/>
-              <a:t>8/15/15</a:t>
+              <a:t>8/17/15</a:t>
             </a:fld>
             <a:endParaRPr lang="en-US"/>
           </a:p>
@@ -2862,7 +2862,7 @@
           <a:p>
             <a:fld id="{51DC3912-A3A9-D04D-BD3B-606E389382B7}" type="datetimeFigureOut">
               <a:rPr lang="en-US" smtClean="0"/>
-              <a:t>8/15/15</a:t>
+              <a:t>8/17/15</a:t>
             </a:fld>
             <a:endParaRPr lang="en-US"/>
           </a:p>
@@ -3075,7 +3075,7 @@
           <a:p>
             <a:fld id="{51DC3912-A3A9-D04D-BD3B-606E389382B7}" type="datetimeFigureOut">
               <a:rPr lang="en-US" smtClean="0"/>
-              <a:t>8/15/15</a:t>
+              <a:t>8/17/15</a:t>
             </a:fld>
             <a:endParaRPr lang="en-US"/>
           </a:p>
@@ -3554,7 +3554,7 @@
         <p:spPr/>
         <p:txBody>
           <a:bodyPr>
-            <a:normAutofit fontScale="92500" lnSpcReduction="20000"/>
+            <a:normAutofit fontScale="77500" lnSpcReduction="20000"/>
           </a:bodyPr>
           <a:lstStyle/>
           <a:p>
@@ -3562,6 +3562,7 @@
               <a:rPr lang="en-US" dirty="0" smtClean="0"/>
               <a:t>We’ve seen that data is held in containers called objects.</a:t>
             </a:r>
+            <a:endParaRPr lang="en-US" dirty="0" smtClean="0"/>
           </a:p>
           <a:p>
             <a:r>
@@ -3594,7 +3595,18 @@
             <a:pPr lvl="1"/>
             <a:r>
               <a:rPr lang="en-US" dirty="0" smtClean="0"/>
-              <a:t>So when we type x = 5, we create a new variable, x, which becomes a name for the object, 5.</a:t>
+              <a:t>So when we type x = 5, we create a new variable, x, which becomes a name for the object, 5</a:t>
+            </a:r>
+            <a:r>
+              <a:rPr lang="en-US" dirty="0" smtClean="0"/>
+              <a:t>.</a:t>
+            </a:r>
+          </a:p>
+          <a:p>
+            <a:pPr lvl="1"/>
+            <a:r>
+              <a:rPr lang="en-US" dirty="0" smtClean="0"/>
+              <a:t>Instead of typing in the memory address, we just type x when we want to use that object.</a:t>
             </a:r>
             <a:endParaRPr lang="en-US" dirty="0"/>
           </a:p>

</xml_diff>